<commit_message>
add reference in slides
</commit_message>
<xml_diff>
--- a/生命周期指北.pptx
+++ b/生命周期指北.pptx
@@ -3079,7 +3079,7 @@
           <a:p>
             <a:pPr algn="r"/>
             <a:r>
-              <a:t>张文清</a:t>
+              <a:t>张文清    .NET西安社区</a:t>
             </a:r>
           </a:p>
           <a:p>
@@ -4828,7 +4828,7 @@
         <p:spPr>
           <a:xfrm>
             <a:off x="7696200" y="3898900"/>
-            <a:ext cx="1803500" cy="754311"/>
+            <a:ext cx="1638003" cy="754311"/>
           </a:xfrm>
           <a:prstGeom prst="rect">
             <a:avLst/>
@@ -4873,8 +4873,8 @@
         </p:nvSpPr>
         <p:spPr>
           <a:xfrm>
-            <a:off x="9664700" y="3898900"/>
-            <a:ext cx="1854300" cy="754311"/>
+            <a:off x="9939559" y="3898900"/>
+            <a:ext cx="1803500" cy="754311"/>
           </a:xfrm>
           <a:prstGeom prst="rect">
             <a:avLst/>
@@ -4991,91 +4991,9 @@
           </a:p>
         </p:txBody>
       </p:sp>
-      <p:cxnSp>
-        <p:nvCxnSpPr>
-          <p:cNvPr id="178" name="Connection Line"/>
-          <p:cNvCxnSpPr>
-            <a:stCxn id="176" idx="0"/>
-            <a:endCxn id="173" idx="0"/>
-          </p:cNvCxnSpPr>
-          <p:nvPr/>
-        </p:nvCxnSpPr>
-        <p:spPr>
-          <a:xfrm>
-            <a:off x="3257401" y="4276055"/>
-            <a:ext cx="2628901" cy="1"/>
-          </a:xfrm>
-          <a:prstGeom prst="straightConnector1">
-            <a:avLst/>
-          </a:prstGeom>
-          <a:ln w="25400">
-            <a:solidFill>
-              <a:schemeClr val="accent1"/>
-            </a:solidFill>
-            <a:miter/>
-            <a:tailEnd type="triangle"/>
-          </a:ln>
-        </p:spPr>
-      </p:cxnSp>
-      <p:cxnSp>
-        <p:nvCxnSpPr>
-          <p:cNvPr id="179" name="Connection Line"/>
-          <p:cNvCxnSpPr>
-            <a:stCxn id="173" idx="0"/>
-            <a:endCxn id="174" idx="0"/>
-          </p:cNvCxnSpPr>
-          <p:nvPr/>
-        </p:nvCxnSpPr>
-        <p:spPr>
-          <a:xfrm>
-            <a:off x="5886301" y="4276055"/>
-            <a:ext cx="2711649" cy="1"/>
-          </a:xfrm>
-          <a:prstGeom prst="straightConnector1">
-            <a:avLst/>
-          </a:prstGeom>
-          <a:ln w="25400">
-            <a:solidFill>
-              <a:schemeClr val="accent1"/>
-            </a:solidFill>
-            <a:prstDash val="sysDot"/>
-            <a:miter lim="400000"/>
-            <a:tailEnd type="triangle"/>
-          </a:ln>
-        </p:spPr>
-      </p:cxnSp>
-      <p:cxnSp>
-        <p:nvCxnSpPr>
-          <p:cNvPr id="180" name="Connection Line"/>
-          <p:cNvCxnSpPr>
-            <a:stCxn id="174" idx="0"/>
-            <a:endCxn id="175" idx="0"/>
-          </p:cNvCxnSpPr>
-          <p:nvPr/>
-        </p:nvCxnSpPr>
-        <p:spPr>
-          <a:xfrm>
-            <a:off x="8597949" y="4276055"/>
-            <a:ext cx="1993901" cy="1"/>
-          </a:xfrm>
-          <a:prstGeom prst="straightConnector1">
-            <a:avLst/>
-          </a:prstGeom>
-          <a:ln w="12700">
-            <a:solidFill>
-              <a:schemeClr val="accent1"/>
-            </a:solidFill>
-            <a:custDash>
-              <a:ds d="200000" sp="200000"/>
-            </a:custDash>
-            <a:miter lim="400000"/>
-            <a:tailEnd type="arrow"/>
-          </a:ln>
-        </p:spPr>
-      </p:cxnSp>
-      <p:sp>
-        <p:nvSpPr>
-          <p:cNvPr id="181" name="Dependency Injection"/>
+      <p:sp>
+        <p:nvSpPr>
+          <p:cNvPr id="178" name="Dependency Injection"/>
           <p:cNvSpPr/>
           <p:nvPr/>
         </p:nvSpPr>
@@ -5115,37 +5033,9 @@
           </a:p>
         </p:txBody>
       </p:sp>
-      <p:cxnSp>
-        <p:nvCxnSpPr>
-          <p:cNvPr id="182" name="Connection Line"/>
-          <p:cNvCxnSpPr>
-            <a:stCxn id="181" idx="0"/>
-            <a:endCxn id="173" idx="0"/>
-          </p:cNvCxnSpPr>
-          <p:nvPr/>
-        </p:nvCxnSpPr>
-        <p:spPr>
-          <a:xfrm>
-            <a:off x="4476601" y="2285429"/>
-            <a:ext cx="1409701" cy="1990627"/>
-          </a:xfrm>
-          <a:prstGeom prst="straightConnector1">
-            <a:avLst/>
-          </a:prstGeom>
-          <a:ln w="38100">
-            <a:solidFill>
-              <a:schemeClr val="accent1">
-                <a:lumOff val="-8470"/>
-              </a:schemeClr>
-            </a:solidFill>
-            <a:miter lim="400000"/>
-            <a:tailEnd type="arrow"/>
-          </a:ln>
-        </p:spPr>
-      </p:cxnSp>
-      <p:sp>
-        <p:nvSpPr>
-          <p:cNvPr id="183" name="Format response"/>
+      <p:sp>
+        <p:nvSpPr>
+          <p:cNvPr id="179" name="Format response"/>
           <p:cNvSpPr/>
           <p:nvPr/>
         </p:nvSpPr>
@@ -5185,35 +5075,9 @@
           </a:p>
         </p:txBody>
       </p:sp>
-      <p:cxnSp>
-        <p:nvCxnSpPr>
-          <p:cNvPr id="184" name="Connection Line"/>
-          <p:cNvCxnSpPr>
-            <a:stCxn id="173" idx="0"/>
-            <a:endCxn id="176" idx="0"/>
-          </p:cNvCxnSpPr>
-          <p:nvPr/>
-        </p:nvCxnSpPr>
-        <p:spPr>
-          <a:xfrm flipH="1">
-            <a:off x="3257401" y="4276055"/>
-            <a:ext cx="2628901" cy="1"/>
-          </a:xfrm>
-          <a:prstGeom prst="straightConnector1">
-            <a:avLst/>
-          </a:prstGeom>
-          <a:ln w="12700">
-            <a:solidFill>
-              <a:schemeClr val="accent1"/>
-            </a:solidFill>
-            <a:miter/>
-            <a:tailEnd type="triangle"/>
-          </a:ln>
-        </p:spPr>
-      </p:cxnSp>
-      <p:sp>
-        <p:nvSpPr>
-          <p:cNvPr id="185" name="Rubber Duck"/>
+      <p:sp>
+        <p:nvSpPr>
+          <p:cNvPr id="180" name="Rubber Duck"/>
           <p:cNvSpPr/>
           <p:nvPr/>
         </p:nvSpPr>
@@ -5345,7 +5209,7 @@
       </p:sp>
       <p:sp>
         <p:nvSpPr>
-          <p:cNvPr id="186" name="Line"/>
+          <p:cNvPr id="181" name="Line"/>
           <p:cNvSpPr/>
           <p:nvPr/>
         </p:nvSpPr>
@@ -5381,14 +5245,14 @@
       </p:sp>
       <p:sp>
         <p:nvSpPr>
-          <p:cNvPr id="187" name="Line"/>
+          <p:cNvPr id="182" name="Line"/>
           <p:cNvSpPr/>
           <p:nvPr/>
         </p:nvSpPr>
         <p:spPr>
           <a:xfrm flipH="1">
-            <a:off x="1854472" y="4667769"/>
-            <a:ext cx="982607" cy="982607"/>
+            <a:off x="1854473" y="4667769"/>
+            <a:ext cx="982606" cy="982606"/>
           </a:xfrm>
           <a:prstGeom prst="line">
             <a:avLst/>
@@ -5417,14 +5281,14 @@
       </p:sp>
       <p:sp>
         <p:nvSpPr>
-          <p:cNvPr id="188" name="request"/>
+          <p:cNvPr id="183" name="request"/>
           <p:cNvSpPr txBox="1"/>
           <p:nvPr/>
         </p:nvSpPr>
         <p:spPr>
           <a:xfrm>
-            <a:off x="857392" y="2983230"/>
-            <a:ext cx="877786" cy="358140"/>
+            <a:off x="857392" y="2983229"/>
+            <a:ext cx="877786" cy="358141"/>
           </a:xfrm>
           <a:prstGeom prst="rect">
             <a:avLst/>
@@ -5461,14 +5325,14 @@
       </p:sp>
       <p:sp>
         <p:nvSpPr>
-          <p:cNvPr id="189" name="response"/>
+          <p:cNvPr id="184" name="response"/>
           <p:cNvSpPr txBox="1"/>
           <p:nvPr/>
         </p:nvSpPr>
         <p:spPr>
           <a:xfrm>
-            <a:off x="857392" y="5375146"/>
-            <a:ext cx="1002356" cy="358141"/>
+            <a:off x="857392" y="5375145"/>
+            <a:ext cx="1002355" cy="358141"/>
           </a:xfrm>
           <a:prstGeom prst="rect">
             <a:avLst/>
@@ -5500,6 +5364,306 @@
             <a:r>
               <a:t>response</a:t>
             </a:r>
+          </a:p>
+        </p:txBody>
+      </p:sp>
+      <p:sp>
+        <p:nvSpPr>
+          <p:cNvPr id="185" name="Line"/>
+          <p:cNvSpPr/>
+          <p:nvPr/>
+        </p:nvSpPr>
+        <p:spPr>
+          <a:xfrm flipV="1">
+            <a:off x="3600826" y="3404468"/>
+            <a:ext cx="575642" cy="575642"/>
+          </a:xfrm>
+          <a:prstGeom prst="line">
+            <a:avLst/>
+          </a:prstGeom>
+          <a:ln w="38100">
+            <a:solidFill>
+              <a:schemeClr val="accent1"/>
+            </a:solidFill>
+            <a:custDash>
+              <a:ds d="200000" sp="200000"/>
+            </a:custDash>
+            <a:miter lim="400000"/>
+            <a:tailEnd type="triangle"/>
+          </a:ln>
+        </p:spPr>
+        <p:txBody>
+          <a:bodyPr lIns="45719" rIns="45719"/>
+          <a:lstStyle/>
+          <a:p>
+            <a:pPr>
+              <a:defRPr>
+                <a:solidFill>
+                  <a:srgbClr val="FFFFFF"/>
+                </a:solidFill>
+              </a:defRPr>
+            </a:pPr>
+          </a:p>
+        </p:txBody>
+      </p:sp>
+      <p:sp>
+        <p:nvSpPr>
+          <p:cNvPr id="186" name="Line"/>
+          <p:cNvSpPr/>
+          <p:nvPr/>
+        </p:nvSpPr>
+        <p:spPr>
+          <a:xfrm>
+            <a:off x="4790718" y="3431087"/>
+            <a:ext cx="571153" cy="571153"/>
+          </a:xfrm>
+          <a:prstGeom prst="line">
+            <a:avLst/>
+          </a:prstGeom>
+          <a:ln w="25400">
+            <a:solidFill>
+              <a:schemeClr val="accent1"/>
+            </a:solidFill>
+            <a:miter lim="400000"/>
+            <a:tailEnd type="triangle"/>
+          </a:ln>
+        </p:spPr>
+        <p:txBody>
+          <a:bodyPr lIns="45719" rIns="45719"/>
+          <a:lstStyle/>
+          <a:p>
+            <a:pPr>
+              <a:defRPr>
+                <a:solidFill>
+                  <a:srgbClr val="FFFFFF"/>
+                </a:solidFill>
+              </a:defRPr>
+            </a:pPr>
+          </a:p>
+        </p:txBody>
+      </p:sp>
+      <p:sp>
+        <p:nvSpPr>
+          <p:cNvPr id="187" name="Line"/>
+          <p:cNvSpPr/>
+          <p:nvPr/>
+        </p:nvSpPr>
+        <p:spPr>
+          <a:xfrm>
+            <a:off x="5239484" y="2323690"/>
+            <a:ext cx="578816" cy="1682794"/>
+          </a:xfrm>
+          <a:prstGeom prst="line">
+            <a:avLst/>
+          </a:prstGeom>
+          <a:ln w="38100">
+            <a:solidFill>
+              <a:schemeClr val="accent1"/>
+            </a:solidFill>
+            <a:miter lim="400000"/>
+            <a:tailEnd type="triangle"/>
+          </a:ln>
+        </p:spPr>
+        <p:txBody>
+          <a:bodyPr lIns="45719" rIns="45719"/>
+          <a:lstStyle/>
+          <a:p>
+            <a:pPr>
+              <a:defRPr>
+                <a:solidFill>
+                  <a:srgbClr val="FFFFFF"/>
+                </a:solidFill>
+              </a:defRPr>
+            </a:pPr>
+          </a:p>
+        </p:txBody>
+      </p:sp>
+      <p:sp>
+        <p:nvSpPr>
+          <p:cNvPr id="188" name="Line"/>
+          <p:cNvSpPr/>
+          <p:nvPr/>
+        </p:nvSpPr>
+        <p:spPr>
+          <a:xfrm flipV="1">
+            <a:off x="6174110" y="2703803"/>
+            <a:ext cx="923083" cy="1314407"/>
+          </a:xfrm>
+          <a:prstGeom prst="line">
+            <a:avLst/>
+          </a:prstGeom>
+          <a:ln w="38100">
+            <a:solidFill>
+              <a:schemeClr val="accent1"/>
+            </a:solidFill>
+            <a:custDash>
+              <a:ds d="200000" sp="200000"/>
+            </a:custDash>
+            <a:miter lim="400000"/>
+            <a:tailEnd type="triangle"/>
+          </a:ln>
+        </p:spPr>
+        <p:txBody>
+          <a:bodyPr lIns="45719" rIns="45719"/>
+          <a:lstStyle/>
+          <a:p>
+            <a:pPr>
+              <a:defRPr>
+                <a:solidFill>
+                  <a:srgbClr val="FFFFFF"/>
+                </a:solidFill>
+              </a:defRPr>
+            </a:pPr>
+          </a:p>
+        </p:txBody>
+      </p:sp>
+      <p:sp>
+        <p:nvSpPr>
+          <p:cNvPr id="189" name="Line"/>
+          <p:cNvSpPr/>
+          <p:nvPr/>
+        </p:nvSpPr>
+        <p:spPr>
+          <a:xfrm>
+            <a:off x="7538602" y="2736950"/>
+            <a:ext cx="729247" cy="1319365"/>
+          </a:xfrm>
+          <a:prstGeom prst="line">
+            <a:avLst/>
+          </a:prstGeom>
+          <a:ln w="25400">
+            <a:solidFill>
+              <a:schemeClr val="accent1"/>
+            </a:solidFill>
+            <a:miter lim="400000"/>
+            <a:tailEnd type="triangle"/>
+          </a:ln>
+        </p:spPr>
+        <p:txBody>
+          <a:bodyPr lIns="45719" rIns="45719"/>
+          <a:lstStyle/>
+          <a:p>
+            <a:pPr>
+              <a:defRPr>
+                <a:solidFill>
+                  <a:srgbClr val="FFFFFF"/>
+                </a:solidFill>
+              </a:defRPr>
+            </a:pPr>
+          </a:p>
+        </p:txBody>
+      </p:sp>
+      <p:sp>
+        <p:nvSpPr>
+          <p:cNvPr id="190" name="Line"/>
+          <p:cNvSpPr/>
+          <p:nvPr/>
+        </p:nvSpPr>
+        <p:spPr>
+          <a:xfrm>
+            <a:off x="9284416" y="4322364"/>
+            <a:ext cx="748611" cy="1"/>
+          </a:xfrm>
+          <a:prstGeom prst="line">
+            <a:avLst/>
+          </a:prstGeom>
+          <a:ln w="38100">
+            <a:solidFill>
+              <a:schemeClr val="accent1"/>
+            </a:solidFill>
+            <a:custDash>
+              <a:ds d="200000" sp="200000"/>
+            </a:custDash>
+            <a:miter lim="400000"/>
+            <a:tailEnd type="triangle"/>
+          </a:ln>
+        </p:spPr>
+        <p:txBody>
+          <a:bodyPr lIns="45719" rIns="45719"/>
+          <a:lstStyle/>
+          <a:p>
+            <a:pPr>
+              <a:defRPr>
+                <a:solidFill>
+                  <a:srgbClr val="FFFFFF"/>
+                </a:solidFill>
+              </a:defRPr>
+            </a:pPr>
+          </a:p>
+        </p:txBody>
+      </p:sp>
+      <p:sp>
+        <p:nvSpPr>
+          <p:cNvPr id="191" name="Line"/>
+          <p:cNvSpPr/>
+          <p:nvPr/>
+        </p:nvSpPr>
+        <p:spPr>
+          <a:xfrm flipH="1">
+            <a:off x="4651703" y="4467323"/>
+            <a:ext cx="696592" cy="978979"/>
+          </a:xfrm>
+          <a:prstGeom prst="line">
+            <a:avLst/>
+          </a:prstGeom>
+          <a:ln w="38100">
+            <a:solidFill>
+              <a:schemeClr val="accent1"/>
+            </a:solidFill>
+            <a:custDash>
+              <a:ds d="200000" sp="200000"/>
+            </a:custDash>
+            <a:miter lim="400000"/>
+            <a:tailEnd type="triangle"/>
+          </a:ln>
+        </p:spPr>
+        <p:txBody>
+          <a:bodyPr lIns="45719" rIns="45719"/>
+          <a:lstStyle/>
+          <a:p>
+            <a:pPr>
+              <a:defRPr>
+                <a:solidFill>
+                  <a:srgbClr val="FFFFFF"/>
+                </a:solidFill>
+              </a:defRPr>
+            </a:pPr>
+          </a:p>
+        </p:txBody>
+      </p:sp>
+      <p:sp>
+        <p:nvSpPr>
+          <p:cNvPr id="192" name="Line"/>
+          <p:cNvSpPr/>
+          <p:nvPr/>
+        </p:nvSpPr>
+        <p:spPr>
+          <a:xfrm flipH="1" flipV="1">
+            <a:off x="3573601" y="4564065"/>
+            <a:ext cx="498669" cy="767281"/>
+          </a:xfrm>
+          <a:prstGeom prst="line">
+            <a:avLst/>
+          </a:prstGeom>
+          <a:ln w="25400">
+            <a:solidFill>
+              <a:schemeClr val="accent1"/>
+            </a:solidFill>
+            <a:miter lim="400000"/>
+            <a:tailEnd type="triangle"/>
+          </a:ln>
+        </p:spPr>
+        <p:txBody>
+          <a:bodyPr lIns="45719" rIns="45719"/>
+          <a:lstStyle/>
+          <a:p>
+            <a:pPr>
+              <a:defRPr>
+                <a:solidFill>
+                  <a:srgbClr val="FFFFFF"/>
+                </a:solidFill>
+              </a:defRPr>
+            </a:pPr>
           </a:p>
         </p:txBody>
       </p:sp>
@@ -5531,7 +5695,7 @@
       </p:grpSpPr>
       <p:pic>
         <p:nvPicPr>
-          <p:cNvPr id="191" name="Picture Placeholder 2" descr="Picture Placeholder 2"/>
+          <p:cNvPr id="194" name="Picture Placeholder 2" descr="Picture Placeholder 2"/>
           <p:cNvPicPr>
             <a:picLocks noChangeAspect="1"/>
           </p:cNvPicPr>
@@ -5556,7 +5720,7 @@
       </p:pic>
       <p:sp>
         <p:nvSpPr>
-          <p:cNvPr id="192" name="5分钟Demo"/>
+          <p:cNvPr id="195" name="5分钟Demo"/>
           <p:cNvSpPr txBox="1"/>
           <p:nvPr>
             <p:ph type="title"/>
@@ -5580,7 +5744,7 @@
       </p:sp>
       <p:sp>
         <p:nvSpPr>
-          <p:cNvPr id="193" name="实现一个简单的MVC应用，添加Model binding，输出view"/>
+          <p:cNvPr id="196" name="实现一个简单的MVC应用，添加Model binding，输出view"/>
           <p:cNvSpPr txBox="1"/>
           <p:nvPr>
             <p:ph type="body" sz="quarter" idx="1"/>
@@ -5630,7 +5794,7 @@
       </p:grpSpPr>
       <p:sp>
         <p:nvSpPr>
-          <p:cNvPr id="195" name="退出 - 被忽略的落幕"/>
+          <p:cNvPr id="198" name="退出 - 被忽略的落幕"/>
           <p:cNvSpPr txBox="1"/>
           <p:nvPr>
             <p:ph type="title"/>
@@ -5654,7 +5818,7 @@
       </p:sp>
       <p:sp>
         <p:nvSpPr>
-          <p:cNvPr id="196" name="Body"/>
+          <p:cNvPr id="199" name="Body"/>
           <p:cNvSpPr txBox="1"/>
           <p:nvPr>
             <p:ph type="body" sz="quarter" idx="1"/>
@@ -5788,7 +5952,7 @@
       </p:grpSpPr>
       <p:sp>
         <p:nvSpPr>
-          <p:cNvPr id="198" name="安全退出（Graceful shutdown）"/>
+          <p:cNvPr id="201" name="安全退出（Graceful shutdown）"/>
           <p:cNvSpPr txBox="1"/>
           <p:nvPr>
             <p:ph type="title"/>
@@ -5812,7 +5976,7 @@
       </p:sp>
       <p:sp>
         <p:nvSpPr>
-          <p:cNvPr id="199" name="Microsoft.AspNetCore.Hosting.IApplicationLifetime"/>
+          <p:cNvPr id="202" name="Microsoft.AspNetCore.Hosting.IApplicationLifetime"/>
           <p:cNvSpPr txBox="1"/>
           <p:nvPr>
             <p:ph type="body" idx="1"/>
@@ -5868,7 +6032,7 @@
       </p:grpSpPr>
       <p:sp>
         <p:nvSpPr>
-          <p:cNvPr id="201" name="感谢！"/>
+          <p:cNvPr id="204" name="感谢！"/>
           <p:cNvSpPr txBox="1"/>
           <p:nvPr>
             <p:ph type="title"/>
@@ -5892,7 +6056,7 @@
       </p:sp>
       <p:sp>
         <p:nvSpPr>
-          <p:cNvPr id="202" name="问题和讨论"/>
+          <p:cNvPr id="205" name="问题和讨论…"/>
           <p:cNvSpPr txBox="1"/>
           <p:nvPr>
             <p:ph type="body" sz="quarter" idx="1"/>
@@ -5907,16 +6071,54 @@
           <a:bodyPr/>
           <a:lstStyle/>
           <a:p>
-            <a:pPr/>
+            <a:pPr defTabSz="877823">
+              <a:spcBef>
+                <a:spcPts val="900"/>
+              </a:spcBef>
+              <a:defRPr sz="2304"/>
+            </a:pPr>
             <a:r>
               <a:t>问题和讨论</a:t>
             </a:r>
           </a:p>
-        </p:txBody>
-      </p:sp>
-      <p:sp>
-        <p:nvSpPr>
-          <p:cNvPr id="203" name="免责声明…"/>
+          <a:p>
+            <a:pPr defTabSz="877823">
+              <a:spcBef>
+                <a:spcPts val="900"/>
+              </a:spcBef>
+              <a:defRPr sz="2304"/>
+            </a:pPr>
+          </a:p>
+          <a:p>
+            <a:pPr defTabSz="877823">
+              <a:spcBef>
+                <a:spcPts val="900"/>
+              </a:spcBef>
+              <a:defRPr sz="2304"/>
+            </a:pPr>
+            <a:r>
+              <a:t>资料和演示代码：</a:t>
+            </a:r>
+            <a:r>
+              <a:rPr u="sng">
+                <a:solidFill>
+                  <a:srgbClr val="0563C1"/>
+                </a:solidFill>
+                <a:uFill>
+                  <a:solidFill>
+                    <a:srgbClr val="0563C1"/>
+                  </a:solidFill>
+                </a:uFill>
+                <a:hlinkClick r:id="rId2" invalidUrl="" action="" tgtFrame="" tooltip="" history="1" highlightClick="0" endSnd="0"/>
+              </a:rPr>
+              <a:t>https://github.com/winkingzhang/aspnetcorelifecycle</a:t>
+            </a:r>
+          </a:p>
+        </p:txBody>
+      </p:sp>
+      <p:sp>
+        <p:nvSpPr>
+          <p:cNvPr id="206" name="免责声明…"/>
           <p:cNvSpPr txBox="1"/>
           <p:nvPr/>
         </p:nvSpPr>
@@ -5980,6 +6182,35 @@
           </a:p>
         </p:txBody>
       </p:sp>
+      <p:pic>
+        <p:nvPicPr>
+          <p:cNvPr id="207" name="图片 7" descr="图片 7"/>
+          <p:cNvPicPr>
+            <a:picLocks noChangeAspect="1"/>
+          </p:cNvPicPr>
+          <p:nvPr/>
+        </p:nvPicPr>
+        <p:blipFill>
+          <a:blip r:embed="rId3">
+            <a:extLst/>
+          </a:blip>
+          <a:stretch>
+            <a:fillRect/>
+          </a:stretch>
+        </p:blipFill>
+        <p:spPr>
+          <a:xfrm>
+            <a:off x="5803380" y="2294314"/>
+            <a:ext cx="4573040" cy="2269372"/>
+          </a:xfrm>
+          <a:prstGeom prst="rect">
+            <a:avLst/>
+          </a:prstGeom>
+          <a:ln w="12700">
+            <a:miter lim="400000"/>
+          </a:ln>
+        </p:spPr>
+      </p:pic>
     </p:spTree>
   </p:cSld>
   <p:clrMapOvr>

</xml_diff>